<commit_message>
Update Ahmet Altay AIUP Demo Day.pptx
</commit_message>
<xml_diff>
--- a/AIUP/AIUP Demo Day/Ahmet Altay AIUP Demo Day.pptx
+++ b/AIUP/AIUP Demo Day/Ahmet Altay AIUP Demo Day.pptx
@@ -67,7 +67,7 @@
         <p:txBody>
           <a:bodyPr/>
           <a:p>
-            <a:fld id="{7E64958C-35F8-4E90-8D6F-001E95552F05}" type="slidenum">
+            <a:fld id="{F1250939-6E82-401D-9E5C-EF4DA253F766}" type="slidenum">
               <a:t>&lt;#&gt;</a:t>
             </a:fld>
           </a:p>
@@ -255,7 +255,7 @@
         <p:txBody>
           <a:bodyPr/>
           <a:p>
-            <a:fld id="{5A7DFB25-90BA-4AB7-9ED5-D1388FE3834A}" type="slidenum">
+            <a:fld id="{98E9B76C-6C87-4457-9D9C-8A515C3F1BD4}" type="slidenum">
               <a:t>&lt;#&gt;</a:t>
             </a:fld>
           </a:p>
@@ -511,7 +511,7 @@
         <p:txBody>
           <a:bodyPr/>
           <a:p>
-            <a:fld id="{9831E372-A811-402F-8647-D6D9FAEB6E48}" type="slidenum">
+            <a:fld id="{8ADA8C7D-777D-484C-84CE-E4DF47088D9E}" type="slidenum">
               <a:t>&lt;#&gt;</a:t>
             </a:fld>
           </a:p>
@@ -835,7 +835,7 @@
         <p:txBody>
           <a:bodyPr/>
           <a:p>
-            <a:fld id="{93F9DBA3-5B63-4B8A-9A76-EDEE23F5BB74}" type="slidenum">
+            <a:fld id="{AD3C5723-7F8E-4A74-9079-D79B23671761}" type="slidenum">
               <a:t>&lt;#&gt;</a:t>
             </a:fld>
           </a:p>
@@ -992,7 +992,7 @@
         <p:txBody>
           <a:bodyPr/>
           <a:p>
-            <a:fld id="{839F70BE-800A-40F2-B2E3-9474E701AC61}" type="slidenum">
+            <a:fld id="{734E6545-9FE3-4188-9869-8C2A730F948D}" type="slidenum">
               <a:t>&lt;#&gt;</a:t>
             </a:fld>
           </a:p>
@@ -1146,7 +1146,7 @@
         <p:txBody>
           <a:bodyPr/>
           <a:p>
-            <a:fld id="{ACE20970-9FF9-4BA0-90FB-07189D7F5C70}" type="slidenum">
+            <a:fld id="{DA9B7FFE-7580-4FC9-A92D-8F5D132CBDF8}" type="slidenum">
               <a:t>&lt;#&gt;</a:t>
             </a:fld>
           </a:p>
@@ -1334,7 +1334,7 @@
         <p:txBody>
           <a:bodyPr/>
           <a:p>
-            <a:fld id="{48FCB3CE-D67D-4C7E-A1DA-4CFC8717EC4C}" type="slidenum">
+            <a:fld id="{0A9AEA5A-8C1D-4B03-9FEE-943F06C0CCF3}" type="slidenum">
               <a:t>&lt;#&gt;</a:t>
             </a:fld>
           </a:p>
@@ -1454,7 +1454,7 @@
         <p:txBody>
           <a:bodyPr/>
           <a:p>
-            <a:fld id="{5A6A808D-F294-4F39-8989-2B7A98AD69DD}" type="slidenum">
+            <a:fld id="{D6DB17EE-E22C-4C5C-A4BB-A0629D3B707D}" type="slidenum">
               <a:t>&lt;#&gt;</a:t>
             </a:fld>
           </a:p>
@@ -1574,7 +1574,7 @@
         <p:txBody>
           <a:bodyPr/>
           <a:p>
-            <a:fld id="{E22492BF-5A12-4D17-BB50-361D90AED33E}" type="slidenum">
+            <a:fld id="{260425EC-DFD5-429A-B80C-87178A926311}" type="slidenum">
               <a:t>&lt;#&gt;</a:t>
             </a:fld>
           </a:p>
@@ -1796,7 +1796,7 @@
         <p:txBody>
           <a:bodyPr/>
           <a:p>
-            <a:fld id="{AC673F7C-0477-4715-BE9C-B038F2BA78EB}" type="slidenum">
+            <a:fld id="{F7387AC9-62A2-458C-A2A7-612A8121C04C}" type="slidenum">
               <a:t>&lt;#&gt;</a:t>
             </a:fld>
           </a:p>
@@ -2018,7 +2018,7 @@
         <p:txBody>
           <a:bodyPr/>
           <a:p>
-            <a:fld id="{82FC6A84-CF4D-42F3-AB67-62DB2553D7C8}" type="slidenum">
+            <a:fld id="{8DF9F444-BD0B-42A0-A90B-19930164D9F5}" type="slidenum">
               <a:t>&lt;#&gt;</a:t>
             </a:fld>
           </a:p>
@@ -2240,7 +2240,7 @@
         <p:txBody>
           <a:bodyPr/>
           <a:p>
-            <a:fld id="{C30FCC38-3B45-47E4-8183-0DAF83783DF8}" type="slidenum">
+            <a:fld id="{293E0FBB-AC18-4BCA-8B56-4DAC5F6147F8}" type="slidenum">
               <a:t>&lt;#&gt;</a:t>
             </a:fld>
           </a:p>
@@ -2309,7 +2309,7 @@
         <p:spPr>
           <a:xfrm>
             <a:off x="3124080" y="6356520"/>
-            <a:ext cx="2894760" cy="364320"/>
+            <a:ext cx="2894400" cy="363960"/>
           </a:xfrm>
           <a:prstGeom prst="rect">
             <a:avLst/>
@@ -2366,7 +2366,7 @@
         <p:spPr>
           <a:xfrm>
             <a:off x="6553080" y="6356520"/>
-            <a:ext cx="2133000" cy="364320"/>
+            <a:ext cx="2132640" cy="363960"/>
           </a:xfrm>
           <a:prstGeom prst="rect">
             <a:avLst/>
@@ -2401,7 +2401,7 @@
               </a:lnSpc>
               <a:buNone/>
             </a:pPr>
-            <a:fld id="{9BD4D4EE-4AA9-443B-9325-01A26856715F}" type="slidenum">
+            <a:fld id="{8D851C21-7B8D-4711-86D5-2AFAC9899F0C}" type="slidenum">
               <a:rPr b="0" lang="en-US" sz="1200" spc="-1" strike="noStrike">
                 <a:solidFill>
                   <a:srgbClr val="8b8b8b"/>
@@ -2429,7 +2429,7 @@
         <p:spPr>
           <a:xfrm>
             <a:off x="457200" y="6356520"/>
-            <a:ext cx="2133000" cy="364320"/>
+            <a:ext cx="2132640" cy="363960"/>
           </a:xfrm>
           <a:prstGeom prst="rect">
             <a:avLst/>
@@ -2742,7 +2742,7 @@
         <p:spPr>
           <a:xfrm>
             <a:off x="1028880" y="2336400"/>
-            <a:ext cx="14936760" cy="6921000"/>
+            <a:ext cx="14936400" cy="6920640"/>
           </a:xfrm>
           <a:prstGeom prst="rect">
             <a:avLst/>
@@ -2770,7 +2770,7 @@
         <p:spPr>
           <a:xfrm>
             <a:off x="1217880" y="2131560"/>
-            <a:ext cx="14937840" cy="6940080"/>
+            <a:ext cx="14937480" cy="6939720"/>
           </a:xfrm>
           <a:prstGeom prst="rect">
             <a:avLst/>
@@ -2801,8 +2801,8 @@
         </p:blipFill>
         <p:spPr>
           <a:xfrm rot="5400000">
-            <a:off x="15876720" y="7748280"/>
-            <a:ext cx="2613600" cy="404640"/>
+            <a:off x="15877080" y="7748280"/>
+            <a:ext cx="2613240" cy="404280"/>
           </a:xfrm>
           <a:prstGeom prst="rect">
             <a:avLst/>
@@ -2825,7 +2825,7 @@
         <p:spPr>
           <a:xfrm>
             <a:off x="1028880" y="1028880"/>
-            <a:ext cx="2604240" cy="376920"/>
+            <a:ext cx="2603880" cy="376560"/>
           </a:xfrm>
           <a:prstGeom prst="rect">
             <a:avLst/>
@@ -2844,9 +2844,9 @@
         <p:grpSpPr>
           <a:xfrm>
             <a:off x="2037240" y="3007080"/>
-            <a:ext cx="13299120" cy="5389200"/>
+            <a:ext cx="13298760" cy="5389200"/>
             <a:chOff x="2037240" y="3007080"/>
-            <a:chExt cx="13299120" cy="5389200"/>
+            <a:chExt cx="13298760" cy="5389200"/>
           </a:xfrm>
         </p:grpSpPr>
         <p:sp>
@@ -2858,7 +2858,7 @@
           <p:spPr>
             <a:xfrm>
               <a:off x="2037240" y="3007080"/>
-              <a:ext cx="13299120" cy="3600720"/>
+              <a:ext cx="13298760" cy="3600360"/>
             </a:xfrm>
             <a:prstGeom prst="rect">
               <a:avLst/>
@@ -2941,7 +2941,7 @@
           <p:spPr>
             <a:xfrm>
               <a:off x="2037240" y="6774480"/>
-              <a:ext cx="13299120" cy="1621800"/>
+              <a:ext cx="13298760" cy="1621800"/>
             </a:xfrm>
             <a:prstGeom prst="rect">
               <a:avLst/>
@@ -3032,8 +3032,8 @@
         </p:blipFill>
         <p:spPr>
           <a:xfrm rot="1417800">
-            <a:off x="13794840" y="703800"/>
-            <a:ext cx="3362040" cy="2454120"/>
+            <a:off x="13794840" y="703440"/>
+            <a:ext cx="3361680" cy="2453760"/>
           </a:xfrm>
           <a:prstGeom prst="rect">
             <a:avLst/>
@@ -3082,7 +3082,7 @@
         <p:spPr>
           <a:xfrm>
             <a:off x="10236960" y="2503800"/>
-            <a:ext cx="7254360" cy="7054560"/>
+            <a:ext cx="7254000" cy="7054200"/>
           </a:xfrm>
           <a:prstGeom prst="rect">
             <a:avLst/>
@@ -3110,7 +3110,7 @@
         <p:spPr>
           <a:xfrm>
             <a:off x="1333080" y="2241360"/>
-            <a:ext cx="15925680" cy="7016040"/>
+            <a:ext cx="15925320" cy="7015680"/>
           </a:xfrm>
           <a:prstGeom prst="rect">
             <a:avLst/>
@@ -3138,7 +3138,7 @@
         <p:spPr>
           <a:xfrm>
             <a:off x="1028880" y="1028880"/>
-            <a:ext cx="8815320" cy="8024040"/>
+            <a:ext cx="8814960" cy="8023680"/>
           </a:xfrm>
           <a:prstGeom prst="rect">
             <a:avLst/>
@@ -3170,7 +3170,7 @@
         <p:spPr>
           <a:xfrm>
             <a:off x="14644800" y="1028880"/>
-            <a:ext cx="2613600" cy="404640"/>
+            <a:ext cx="2613240" cy="404280"/>
           </a:xfrm>
           <a:prstGeom prst="rect">
             <a:avLst/>
@@ -3189,7 +3189,7 @@
         <p:spPr>
           <a:xfrm>
             <a:off x="1876320" y="4393080"/>
-            <a:ext cx="9059040" cy="1600200"/>
+            <a:ext cx="9058680" cy="1599840"/>
           </a:xfrm>
           <a:prstGeom prst="rect">
             <a:avLst/>
@@ -3241,7 +3241,7 @@
         <p:spPr>
           <a:xfrm>
             <a:off x="10249920" y="3936600"/>
-            <a:ext cx="6742440" cy="3777480"/>
+            <a:ext cx="6742080" cy="3777480"/>
           </a:xfrm>
           <a:prstGeom prst="rect">
             <a:avLst/>
@@ -3344,9 +3344,9 @@
         <p:grpSpPr>
           <a:xfrm>
             <a:off x="10152000" y="8640000"/>
-            <a:ext cx="7505640" cy="1559160"/>
+            <a:ext cx="7505280" cy="1558800"/>
             <a:chOff x="10152000" y="8640000"/>
-            <a:chExt cx="7505640" cy="1559160"/>
+            <a:chExt cx="7505280" cy="1558800"/>
           </a:xfrm>
         </p:grpSpPr>
         <p:sp>
@@ -3358,7 +3358,7 @@
           <p:spPr>
             <a:xfrm>
               <a:off x="10152000" y="8640000"/>
-              <a:ext cx="7505640" cy="1559160"/>
+              <a:ext cx="7505280" cy="1558800"/>
             </a:xfrm>
             <a:custGeom>
               <a:avLst/>
@@ -3407,9 +3407,9 @@
         <p:grpSpPr>
           <a:xfrm>
             <a:off x="360000" y="8640000"/>
-            <a:ext cx="8459640" cy="1559160"/>
+            <a:ext cx="8459280" cy="1558800"/>
             <a:chOff x="360000" y="8640000"/>
-            <a:chExt cx="8459640" cy="1559160"/>
+            <a:chExt cx="8459280" cy="1558800"/>
           </a:xfrm>
         </p:grpSpPr>
         <p:sp>
@@ -3421,7 +3421,7 @@
           <p:spPr>
             <a:xfrm>
               <a:off x="360000" y="8640000"/>
-              <a:ext cx="8459640" cy="1559160"/>
+              <a:ext cx="8459280" cy="1558800"/>
             </a:xfrm>
             <a:custGeom>
               <a:avLst/>
@@ -3470,9 +3470,9 @@
         <p:grpSpPr>
           <a:xfrm>
             <a:off x="359640" y="4573440"/>
-            <a:ext cx="3931200" cy="3647160"/>
+            <a:ext cx="3930840" cy="3646800"/>
             <a:chOff x="359640" y="4573440"/>
-            <a:chExt cx="3931200" cy="3647160"/>
+            <a:chExt cx="3930840" cy="3646800"/>
           </a:xfrm>
         </p:grpSpPr>
         <p:sp>
@@ -3484,7 +3484,7 @@
           <p:spPr>
             <a:xfrm>
               <a:off x="359640" y="4573440"/>
-              <a:ext cx="3931200" cy="3647160"/>
+              <a:ext cx="3930840" cy="3646800"/>
             </a:xfrm>
             <a:custGeom>
               <a:avLst/>
@@ -3533,9 +3533,9 @@
         <p:grpSpPr>
           <a:xfrm>
             <a:off x="4881600" y="4573440"/>
-            <a:ext cx="3951360" cy="3647160"/>
+            <a:ext cx="3951000" cy="3646800"/>
             <a:chOff x="4881600" y="4573440"/>
-            <a:chExt cx="3951360" cy="3647160"/>
+            <a:chExt cx="3951000" cy="3646800"/>
           </a:xfrm>
         </p:grpSpPr>
         <p:sp>
@@ -3547,7 +3547,7 @@
           <p:spPr>
             <a:xfrm>
               <a:off x="4881600" y="4573440"/>
-              <a:ext cx="3951360" cy="3647160"/>
+              <a:ext cx="3951000" cy="3646800"/>
             </a:xfrm>
             <a:custGeom>
               <a:avLst/>
@@ -3595,10 +3595,10 @@
         </p:nvGrpSpPr>
         <p:grpSpPr>
           <a:xfrm>
-            <a:off x="540000" y="8460360"/>
-            <a:ext cx="8609760" cy="1599120"/>
-            <a:chOff x="540000" y="8460360"/>
-            <a:chExt cx="8609760" cy="1599120"/>
+            <a:off x="540000" y="8460720"/>
+            <a:ext cx="8609400" cy="1598760"/>
+            <a:chOff x="540000" y="8460720"/>
+            <a:chExt cx="8609400" cy="1598760"/>
           </a:xfrm>
         </p:grpSpPr>
         <p:sp>
@@ -3609,8 +3609,8 @@
           </p:nvSpPr>
           <p:spPr>
             <a:xfrm rot="16200000">
-              <a:off x="4045320" y="4955040"/>
-              <a:ext cx="1599120" cy="8609760"/>
+              <a:off x="4045320" y="4955400"/>
+              <a:ext cx="1598760" cy="8609400"/>
             </a:xfrm>
             <a:custGeom>
               <a:avLst/>
@@ -3659,9 +3659,9 @@
         <p:grpSpPr>
           <a:xfrm>
             <a:off x="10152000" y="455400"/>
-            <a:ext cx="7505280" cy="7765200"/>
+            <a:ext cx="7504920" cy="7764840"/>
             <a:chOff x="10152000" y="455400"/>
-            <a:chExt cx="7505280" cy="7765200"/>
+            <a:chExt cx="7504920" cy="7764840"/>
           </a:xfrm>
         </p:grpSpPr>
         <p:sp>
@@ -3673,7 +3673,7 @@
           <p:spPr>
             <a:xfrm>
               <a:off x="10152000" y="455400"/>
-              <a:ext cx="7505280" cy="7765200"/>
+              <a:ext cx="7504920" cy="7764840"/>
             </a:xfrm>
             <a:custGeom>
               <a:avLst/>
@@ -3721,10 +3721,10 @@
         </p:nvGrpSpPr>
         <p:grpSpPr>
           <a:xfrm>
-            <a:off x="10324800" y="8460360"/>
-            <a:ext cx="7534440" cy="1598040"/>
-            <a:chOff x="10324800" y="8460360"/>
-            <a:chExt cx="7534440" cy="1598040"/>
+            <a:off x="10324800" y="8460720"/>
+            <a:ext cx="7534080" cy="1597680"/>
+            <a:chOff x="10324800" y="8460720"/>
+            <a:chExt cx="7534080" cy="1597680"/>
           </a:xfrm>
         </p:grpSpPr>
         <p:sp>
@@ -3735,8 +3735,8 @@
           </p:nvSpPr>
           <p:spPr>
             <a:xfrm rot="16200000">
-              <a:off x="13293000" y="5492160"/>
-              <a:ext cx="1598040" cy="7534440"/>
+              <a:off x="13293000" y="5492520"/>
+              <a:ext cx="1597680" cy="7534080"/>
             </a:xfrm>
             <a:custGeom>
               <a:avLst/>
@@ -3785,9 +3785,9 @@
         <p:grpSpPr>
           <a:xfrm>
             <a:off x="359640" y="455400"/>
-            <a:ext cx="3931200" cy="3709800"/>
+            <a:ext cx="3930840" cy="3709440"/>
             <a:chOff x="359640" y="455400"/>
-            <a:chExt cx="3931200" cy="3709800"/>
+            <a:chExt cx="3930840" cy="3709440"/>
           </a:xfrm>
         </p:grpSpPr>
         <p:sp>
@@ -3799,7 +3799,7 @@
           <p:spPr>
             <a:xfrm>
               <a:off x="359640" y="455400"/>
-              <a:ext cx="3931200" cy="3709800"/>
+              <a:ext cx="3930840" cy="3709440"/>
             </a:xfrm>
             <a:custGeom>
               <a:avLst/>
@@ -3852,7 +3852,7 @@
         <p:spPr>
           <a:xfrm>
             <a:off x="561960" y="216720"/>
-            <a:ext cx="3980160" cy="3691440"/>
+            <a:ext cx="3979800" cy="3691080"/>
           </a:xfrm>
           <a:prstGeom prst="rect">
             <a:avLst/>
@@ -3871,9 +3871,9 @@
         <p:grpSpPr>
           <a:xfrm>
             <a:off x="4881600" y="455400"/>
-            <a:ext cx="4062600" cy="3709800"/>
+            <a:ext cx="4062240" cy="3709440"/>
             <a:chOff x="4881600" y="455400"/>
-            <a:chExt cx="4062600" cy="3709800"/>
+            <a:chExt cx="4062240" cy="3709440"/>
           </a:xfrm>
         </p:grpSpPr>
         <p:sp>
@@ -3885,7 +3885,7 @@
           <p:spPr>
             <a:xfrm>
               <a:off x="4881600" y="455400"/>
-              <a:ext cx="4062600" cy="3709800"/>
+              <a:ext cx="4062240" cy="3709440"/>
             </a:xfrm>
             <a:custGeom>
               <a:avLst/>
@@ -3938,7 +3938,7 @@
         <p:spPr>
           <a:xfrm>
             <a:off x="5139720" y="216720"/>
-            <a:ext cx="4003560" cy="3691440"/>
+            <a:ext cx="4003200" cy="3691080"/>
           </a:xfrm>
           <a:prstGeom prst="rect">
             <a:avLst/>
@@ -3961,7 +3961,7 @@
         <p:spPr>
           <a:xfrm>
             <a:off x="561960" y="4411800"/>
-            <a:ext cx="3980160" cy="3586680"/>
+            <a:ext cx="3979800" cy="3586320"/>
           </a:xfrm>
           <a:prstGeom prst="rect">
             <a:avLst/>
@@ -3985,7 +3985,7 @@
         <p:spPr>
           <a:xfrm>
             <a:off x="5139720" y="4411800"/>
-            <a:ext cx="4003560" cy="3586680"/>
+            <a:ext cx="4003200" cy="3586320"/>
           </a:xfrm>
           <a:prstGeom prst="rect">
             <a:avLst/>
@@ -4008,7 +4008,7 @@
         <p:spPr>
           <a:xfrm>
             <a:off x="10324800" y="216720"/>
-            <a:ext cx="7533720" cy="7782120"/>
+            <a:ext cx="7533360" cy="7781760"/>
           </a:xfrm>
           <a:prstGeom prst="rect">
             <a:avLst/>
@@ -4027,9 +4027,9 @@
         <p:grpSpPr>
           <a:xfrm>
             <a:off x="721440" y="8746560"/>
-            <a:ext cx="8098200" cy="746280"/>
+            <a:ext cx="8097840" cy="746280"/>
             <a:chOff x="721440" y="8746560"/>
-            <a:chExt cx="8098200" cy="746280"/>
+            <a:chExt cx="8097840" cy="746280"/>
           </a:xfrm>
         </p:grpSpPr>
         <p:sp>
@@ -4041,7 +4041,7 @@
           <p:spPr>
             <a:xfrm>
               <a:off x="721440" y="8746560"/>
-              <a:ext cx="8098200" cy="362880"/>
+              <a:ext cx="8097840" cy="362880"/>
             </a:xfrm>
             <a:prstGeom prst="rect">
               <a:avLst/>
@@ -4096,7 +4096,7 @@
           <p:spPr>
             <a:xfrm>
               <a:off x="721440" y="9222840"/>
-              <a:ext cx="8098200" cy="270000"/>
+              <a:ext cx="8097840" cy="270000"/>
             </a:xfrm>
             <a:prstGeom prst="rect">
               <a:avLst/>
@@ -4172,9 +4172,9 @@
         <p:grpSpPr>
           <a:xfrm>
             <a:off x="10579680" y="8640000"/>
-            <a:ext cx="6519960" cy="1287000"/>
+            <a:ext cx="6519600" cy="1287000"/>
             <a:chOff x="10579680" y="8640000"/>
-            <a:chExt cx="6519960" cy="1287000"/>
+            <a:chExt cx="6519600" cy="1287000"/>
           </a:xfrm>
         </p:grpSpPr>
         <p:sp>
@@ -4186,7 +4186,7 @@
           <p:spPr>
             <a:xfrm>
               <a:off x="10579680" y="8640000"/>
-              <a:ext cx="6519960" cy="362880"/>
+              <a:ext cx="6519600" cy="362880"/>
             </a:xfrm>
             <a:prstGeom prst="rect">
               <a:avLst/>
@@ -4241,7 +4241,7 @@
           <p:spPr>
             <a:xfrm>
               <a:off x="10579680" y="9116280"/>
-              <a:ext cx="6519960" cy="810720"/>
+              <a:ext cx="6519600" cy="810720"/>
             </a:xfrm>
             <a:prstGeom prst="rect">
               <a:avLst/>
@@ -4374,7 +4374,7 @@
         <p:spPr>
           <a:xfrm>
             <a:off x="231480" y="1257120"/>
-            <a:ext cx="8068680" cy="3885480"/>
+            <a:ext cx="8068320" cy="3885120"/>
           </a:xfrm>
           <a:prstGeom prst="rect">
             <a:avLst/>
@@ -4402,7 +4402,7 @@
         <p:spPr>
           <a:xfrm>
             <a:off x="2575440" y="1028880"/>
-            <a:ext cx="6086160" cy="3813840"/>
+            <a:ext cx="6085800" cy="3813480"/>
           </a:xfrm>
           <a:prstGeom prst="rect">
             <a:avLst/>
@@ -4430,7 +4430,7 @@
         <p:spPr>
           <a:xfrm>
             <a:off x="9144000" y="1257120"/>
-            <a:ext cx="7608960" cy="3885480"/>
+            <a:ext cx="7608600" cy="3885120"/>
           </a:xfrm>
           <a:prstGeom prst="rect">
             <a:avLst/>
@@ -4458,7 +4458,7 @@
         <p:spPr>
           <a:xfrm>
             <a:off x="11626200" y="1028880"/>
-            <a:ext cx="6131520" cy="3813840"/>
+            <a:ext cx="6131160" cy="3813480"/>
           </a:xfrm>
           <a:prstGeom prst="rect">
             <a:avLst/>
@@ -4486,7 +4486,7 @@
         <p:spPr>
           <a:xfrm>
             <a:off x="231480" y="5672160"/>
-            <a:ext cx="7608960" cy="3844800"/>
+            <a:ext cx="7608600" cy="3844440"/>
           </a:xfrm>
           <a:prstGeom prst="rect">
             <a:avLst/>
@@ -4514,7 +4514,7 @@
         <p:spPr>
           <a:xfrm>
             <a:off x="2575440" y="5443560"/>
-            <a:ext cx="6086160" cy="3813840"/>
+            <a:ext cx="6085800" cy="3813480"/>
           </a:xfrm>
           <a:prstGeom prst="rect">
             <a:avLst/>
@@ -4542,7 +4542,7 @@
         <p:spPr>
           <a:xfrm>
             <a:off x="9144000" y="5672160"/>
-            <a:ext cx="7608960" cy="3844800"/>
+            <a:ext cx="7608600" cy="3844440"/>
           </a:xfrm>
           <a:prstGeom prst="rect">
             <a:avLst/>
@@ -4570,7 +4570,7 @@
         <p:spPr>
           <a:xfrm>
             <a:off x="11626200" y="5443560"/>
-            <a:ext cx="6131520" cy="3813840"/>
+            <a:ext cx="6131160" cy="3813480"/>
           </a:xfrm>
           <a:prstGeom prst="rect">
             <a:avLst/>
@@ -4603,7 +4603,7 @@
         <p:spPr>
           <a:xfrm>
             <a:off x="2693520" y="1119240"/>
-            <a:ext cx="5849640" cy="3633120"/>
+            <a:ext cx="5849280" cy="3632760"/>
           </a:xfrm>
           <a:prstGeom prst="rect">
             <a:avLst/>
@@ -4627,7 +4627,7 @@
         <p:spPr>
           <a:xfrm>
             <a:off x="2693520" y="5533920"/>
-            <a:ext cx="5849640" cy="3633120"/>
+            <a:ext cx="5849280" cy="3632760"/>
           </a:xfrm>
           <a:prstGeom prst="rect">
             <a:avLst/>
@@ -4650,7 +4650,7 @@
         <p:spPr>
           <a:xfrm>
             <a:off x="11794320" y="1119240"/>
-            <a:ext cx="5821920" cy="3633120"/>
+            <a:ext cx="5821560" cy="3632760"/>
           </a:xfrm>
           <a:prstGeom prst="rect">
             <a:avLst/>
@@ -4673,7 +4673,7 @@
         <p:spPr>
           <a:xfrm>
             <a:off x="11794320" y="5532480"/>
-            <a:ext cx="5821920" cy="3634560"/>
+            <a:ext cx="5821560" cy="3634200"/>
           </a:xfrm>
           <a:prstGeom prst="rect">
             <a:avLst/>
@@ -4692,9 +4692,9 @@
         <p:grpSpPr>
           <a:xfrm>
             <a:off x="392760" y="1809000"/>
-            <a:ext cx="1946880" cy="2268720"/>
+            <a:ext cx="1946520" cy="2268360"/>
             <a:chOff x="392760" y="1809000"/>
-            <a:chExt cx="1946880" cy="2268720"/>
+            <a:chExt cx="1946520" cy="2268360"/>
           </a:xfrm>
         </p:grpSpPr>
         <p:sp>
@@ -4706,7 +4706,7 @@
           <p:spPr>
             <a:xfrm>
               <a:off x="392760" y="1809000"/>
-              <a:ext cx="1946880" cy="975240"/>
+              <a:ext cx="1946520" cy="975240"/>
             </a:xfrm>
             <a:prstGeom prst="rect">
               <a:avLst/>
@@ -4761,7 +4761,7 @@
           <p:spPr>
             <a:xfrm>
               <a:off x="392760" y="2980440"/>
-              <a:ext cx="1946880" cy="1097280"/>
+              <a:ext cx="1946520" cy="1096920"/>
             </a:xfrm>
             <a:prstGeom prst="rect">
               <a:avLst/>
@@ -4814,9 +4814,9 @@
         <p:grpSpPr>
           <a:xfrm>
             <a:off x="9285840" y="1417320"/>
-            <a:ext cx="2233800" cy="2848680"/>
+            <a:ext cx="2233440" cy="2848320"/>
             <a:chOff x="9285840" y="1417320"/>
-            <a:chExt cx="2233800" cy="2848680"/>
+            <a:chExt cx="2233440" cy="2848320"/>
           </a:xfrm>
         </p:grpSpPr>
         <p:sp>
@@ -4828,7 +4828,7 @@
           <p:spPr>
             <a:xfrm>
               <a:off x="9285840" y="1417320"/>
-              <a:ext cx="2058120" cy="487440"/>
+              <a:ext cx="2057760" cy="487440"/>
             </a:xfrm>
             <a:prstGeom prst="rect">
               <a:avLst/>
@@ -4883,7 +4883,7 @@
           <p:spPr>
             <a:xfrm>
               <a:off x="9285840" y="1980000"/>
-              <a:ext cx="2233800" cy="2286000"/>
+              <a:ext cx="2233440" cy="2285640"/>
             </a:xfrm>
             <a:prstGeom prst="rect">
               <a:avLst/>
@@ -4936,9 +4936,9 @@
         <p:grpSpPr>
           <a:xfrm>
             <a:off x="392760" y="6107400"/>
-            <a:ext cx="1946880" cy="3103560"/>
+            <a:ext cx="1946520" cy="3103200"/>
             <a:chOff x="392760" y="6107400"/>
-            <a:chExt cx="1946880" cy="3103560"/>
+            <a:chExt cx="1946520" cy="3103200"/>
           </a:xfrm>
         </p:grpSpPr>
         <p:sp>
@@ -4950,7 +4950,7 @@
           <p:spPr>
             <a:xfrm>
               <a:off x="392760" y="6107400"/>
-              <a:ext cx="1946880" cy="975240"/>
+              <a:ext cx="1946520" cy="975240"/>
             </a:xfrm>
             <a:prstGeom prst="rect">
               <a:avLst/>
@@ -5005,7 +5005,7 @@
           <p:spPr>
             <a:xfrm>
               <a:off x="392760" y="7290720"/>
-              <a:ext cx="1946880" cy="1920240"/>
+              <a:ext cx="1946520" cy="1919880"/>
             </a:xfrm>
             <a:prstGeom prst="rect">
               <a:avLst/>
@@ -5058,9 +5058,9 @@
         <p:grpSpPr>
           <a:xfrm>
             <a:off x="9285840" y="6191640"/>
-            <a:ext cx="2058120" cy="2346480"/>
+            <a:ext cx="2057760" cy="2346120"/>
             <a:chOff x="9285840" y="6191640"/>
-            <a:chExt cx="2058120" cy="2346480"/>
+            <a:chExt cx="2057760" cy="2346120"/>
           </a:xfrm>
         </p:grpSpPr>
         <p:sp>
@@ -5072,7 +5072,7 @@
           <p:spPr>
             <a:xfrm>
               <a:off x="9285840" y="6191640"/>
-              <a:ext cx="2058120" cy="487440"/>
+              <a:ext cx="2057760" cy="487440"/>
             </a:xfrm>
             <a:prstGeom prst="rect">
               <a:avLst/>
@@ -5127,7 +5127,7 @@
           <p:spPr>
             <a:xfrm>
               <a:off x="9285840" y="6892200"/>
-              <a:ext cx="2058120" cy="1645920"/>
+              <a:ext cx="2057760" cy="1645560"/>
             </a:xfrm>
             <a:prstGeom prst="rect">
               <a:avLst/>
@@ -5216,10 +5216,10 @@
         </p:nvGrpSpPr>
         <p:grpSpPr>
           <a:xfrm>
-            <a:off x="1024200" y="7842600"/>
-            <a:ext cx="1618920" cy="1409400"/>
-            <a:chOff x="1024200" y="7842600"/>
-            <a:chExt cx="1618920" cy="1409400"/>
+            <a:off x="1024560" y="7842960"/>
+            <a:ext cx="1618560" cy="1409040"/>
+            <a:chOff x="1024560" y="7842960"/>
+            <a:chExt cx="1618560" cy="1409040"/>
           </a:xfrm>
         </p:grpSpPr>
         <p:pic>
@@ -5234,8 +5234,8 @@
           </p:blipFill>
           <p:spPr>
             <a:xfrm rot="10800000">
-              <a:off x="1024200" y="7842600"/>
-              <a:ext cx="1409400" cy="1409400"/>
+              <a:off x="1024560" y="7842960"/>
+              <a:ext cx="1409040" cy="1409040"/>
             </a:xfrm>
             <a:prstGeom prst="rect">
               <a:avLst/>
@@ -5253,10 +5253,10 @@
           </p:nvGrpSpPr>
           <p:grpSpPr>
             <a:xfrm>
-              <a:off x="2224800" y="8327880"/>
-              <a:ext cx="418320" cy="438480"/>
-              <a:chOff x="2224800" y="8327880"/>
-              <a:chExt cx="418320" cy="438480"/>
+              <a:off x="2225160" y="8328240"/>
+              <a:ext cx="417960" cy="438120"/>
+              <a:chOff x="2225160" y="8328240"/>
+              <a:chExt cx="417960" cy="438120"/>
             </a:xfrm>
           </p:grpSpPr>
           <p:sp>
@@ -5267,8 +5267,8 @@
             </p:nvSpPr>
             <p:spPr>
               <a:xfrm rot="10800000">
-                <a:off x="2224800" y="8327880"/>
-                <a:ext cx="418320" cy="438480"/>
+                <a:off x="2225160" y="8328240"/>
+                <a:ext cx="417960" cy="438120"/>
               </a:xfrm>
               <a:custGeom>
                 <a:avLst/>
@@ -5343,7 +5343,7 @@
         <p:spPr>
           <a:xfrm>
             <a:off x="1028880" y="1028880"/>
-            <a:ext cx="1613520" cy="1177560"/>
+            <a:ext cx="1613160" cy="1177200"/>
           </a:xfrm>
           <a:prstGeom prst="rect">
             <a:avLst/>
@@ -5366,7 +5366,7 @@
         <p:spPr>
           <a:xfrm>
             <a:off x="15644880" y="8079840"/>
-            <a:ext cx="1613520" cy="1177560"/>
+            <a:ext cx="1613160" cy="1177200"/>
           </a:xfrm>
           <a:prstGeom prst="rect">
             <a:avLst/>
@@ -5385,9 +5385,9 @@
         <p:grpSpPr>
           <a:xfrm>
             <a:off x="15639480" y="1035000"/>
-            <a:ext cx="1618920" cy="1409400"/>
+            <a:ext cx="1618560" cy="1409040"/>
             <a:chOff x="15639480" y="1035000"/>
-            <a:chExt cx="1618920" cy="1409400"/>
+            <a:chExt cx="1618560" cy="1409040"/>
           </a:xfrm>
         </p:grpSpPr>
         <p:pic>
@@ -5403,7 +5403,7 @@
           <p:spPr>
             <a:xfrm>
               <a:off x="15849000" y="1035000"/>
-              <a:ext cx="1409400" cy="1409400"/>
+              <a:ext cx="1409040" cy="1409040"/>
             </a:xfrm>
             <a:prstGeom prst="rect">
               <a:avLst/>
@@ -5422,9 +5422,9 @@
           <p:grpSpPr>
             <a:xfrm>
               <a:off x="15639480" y="1520640"/>
-              <a:ext cx="418320" cy="438480"/>
+              <a:ext cx="417960" cy="438120"/>
               <a:chOff x="15639480" y="1520640"/>
-              <a:chExt cx="418320" cy="438480"/>
+              <a:chExt cx="417960" cy="438120"/>
             </a:xfrm>
           </p:grpSpPr>
           <p:sp>
@@ -5436,7 +5436,7 @@
             <p:spPr>
               <a:xfrm>
                 <a:off x="15639480" y="1520640"/>
-                <a:ext cx="418320" cy="438480"/>
+                <a:ext cx="417960" cy="438120"/>
               </a:xfrm>
               <a:custGeom>
                 <a:avLst/>
@@ -5507,9 +5507,9 @@
         <p:grpSpPr>
           <a:xfrm>
             <a:off x="3483000" y="2958120"/>
-            <a:ext cx="11321640" cy="4370040"/>
+            <a:ext cx="11321280" cy="4369680"/>
             <a:chOff x="3483000" y="2958120"/>
-            <a:chExt cx="11321640" cy="4370040"/>
+            <a:chExt cx="11321280" cy="4369680"/>
           </a:xfrm>
         </p:grpSpPr>
         <p:sp>
@@ -5521,7 +5521,7 @@
           <p:spPr>
             <a:xfrm>
               <a:off x="3483000" y="2958120"/>
-              <a:ext cx="11321640" cy="3400920"/>
+              <a:ext cx="11321280" cy="3400560"/>
             </a:xfrm>
             <a:prstGeom prst="rect">
               <a:avLst/>
@@ -5573,7 +5573,7 @@
           <p:spPr>
             <a:xfrm>
               <a:off x="3483000" y="6534720"/>
-              <a:ext cx="11321640" cy="793440"/>
+              <a:ext cx="11321280" cy="793080"/>
             </a:xfrm>
             <a:prstGeom prst="rect">
               <a:avLst/>
@@ -5632,7 +5632,7 @@
                   <a:latin typeface="Clear Sans Regular"/>
                   <a:ea typeface="DejaVu Sans"/>
                 </a:rPr>
-                <a:t>Kod: github.com/Spaktra/AIUP/blob/main/AIUP/Ahmet_Altay_Demo_Day_Code.ipynb</a:t>
+                <a:t>Kod: github.com/Spaktra/AIUP/tree/main/AIUP/AIUP%20Demo%20Day</a:t>
               </a:r>
               <a:endParaRPr b="0" lang="tr-TR" sz="2200" spc="-1" strike="noStrike">
                 <a:latin typeface="Arial"/>

</xml_diff>